<commit_message>
Take relevant plots from hpsa_eda.ipynb about high-priority states and add into eda_summary_presentation.pptx
</commit_message>
<xml_diff>
--- a/eda_summary_presentation.pptx
+++ b/eda_summary_presentation.pptx
@@ -4019,6 +4019,230 @@
               </a:rPr>
               <a:t>1) Which states are facing the most severe shortages of primary care practitioners?</a:t>
             </a:r>
+          </a:p>
+        </p:txBody>
+      </p:sp>
+      <p:pic>
+        <p:nvPicPr>
+          <p:cNvPr id="6" name="Picture 5">
+            <a:extLst>
+              <a:ext uri="{FF2B5EF4-FFF2-40B4-BE49-F238E27FC236}">
+                <a16:creationId xmlns:a16="http://schemas.microsoft.com/office/drawing/2014/main" id="{D52FD449-BFD5-D105-E0FB-483DB1E7F2AA}"/>
+              </a:ext>
+            </a:extLst>
+          </p:cNvPr>
+          <p:cNvPicPr>
+            <a:picLocks noChangeAspect="1"/>
+          </p:cNvPicPr>
+          <p:nvPr/>
+        </p:nvPicPr>
+        <p:blipFill>
+          <a:blip r:embed="rId2"/>
+          <a:stretch>
+            <a:fillRect/>
+          </a:stretch>
+        </p:blipFill>
+        <p:spPr>
+          <a:xfrm>
+            <a:off x="2029154" y="1676400"/>
+            <a:ext cx="2405693" cy="1975778"/>
+          </a:xfrm>
+          <a:prstGeom prst="rect">
+            <a:avLst/>
+          </a:prstGeom>
+        </p:spPr>
+      </p:pic>
+      <p:pic>
+        <p:nvPicPr>
+          <p:cNvPr id="7" name="Picture 6">
+            <a:extLst>
+              <a:ext uri="{FF2B5EF4-FFF2-40B4-BE49-F238E27FC236}">
+                <a16:creationId xmlns:a16="http://schemas.microsoft.com/office/drawing/2014/main" id="{0E4062A2-4232-5A96-2537-51D2A991FA08}"/>
+              </a:ext>
+            </a:extLst>
+          </p:cNvPr>
+          <p:cNvPicPr>
+            <a:picLocks noChangeAspect="1"/>
+          </p:cNvPicPr>
+          <p:nvPr/>
+        </p:nvPicPr>
+        <p:blipFill>
+          <a:blip r:embed="rId3"/>
+          <a:stretch>
+            <a:fillRect/>
+          </a:stretch>
+        </p:blipFill>
+        <p:spPr>
+          <a:xfrm>
+            <a:off x="6990082" y="1342944"/>
+            <a:ext cx="3983397" cy="2642691"/>
+          </a:xfrm>
+          <a:prstGeom prst="rect">
+            <a:avLst/>
+          </a:prstGeom>
+        </p:spPr>
+      </p:pic>
+      <p:pic>
+        <p:nvPicPr>
+          <p:cNvPr id="8" name="Picture 7">
+            <a:extLst>
+              <a:ext uri="{FF2B5EF4-FFF2-40B4-BE49-F238E27FC236}">
+                <a16:creationId xmlns:a16="http://schemas.microsoft.com/office/drawing/2014/main" id="{8BBB2E29-002C-DAA7-FDB3-7D24CCEEB69F}"/>
+              </a:ext>
+            </a:extLst>
+          </p:cNvPr>
+          <p:cNvPicPr>
+            <a:picLocks noChangeAspect="1"/>
+          </p:cNvPicPr>
+          <p:nvPr/>
+        </p:nvPicPr>
+        <p:blipFill>
+          <a:blip r:embed="rId4"/>
+          <a:stretch>
+            <a:fillRect/>
+          </a:stretch>
+        </p:blipFill>
+        <p:spPr>
+          <a:xfrm>
+            <a:off x="1262082" y="4114590"/>
+            <a:ext cx="3939838" cy="2642691"/>
+          </a:xfrm>
+          <a:prstGeom prst="rect">
+            <a:avLst/>
+          </a:prstGeom>
+        </p:spPr>
+      </p:pic>
+      <p:pic>
+        <p:nvPicPr>
+          <p:cNvPr id="9" name="Picture 8">
+            <a:extLst>
+              <a:ext uri="{FF2B5EF4-FFF2-40B4-BE49-F238E27FC236}">
+                <a16:creationId xmlns:a16="http://schemas.microsoft.com/office/drawing/2014/main" id="{91F4D02D-F0CC-2753-D3EC-A6E4A0748C54}"/>
+              </a:ext>
+            </a:extLst>
+          </p:cNvPr>
+          <p:cNvPicPr>
+            <a:picLocks noChangeAspect="1"/>
+          </p:cNvPicPr>
+          <p:nvPr/>
+        </p:nvPicPr>
+        <p:blipFill>
+          <a:blip r:embed="rId5"/>
+          <a:stretch>
+            <a:fillRect/>
+          </a:stretch>
+        </p:blipFill>
+        <p:spPr>
+          <a:xfrm>
+            <a:off x="6990082" y="4114590"/>
+            <a:ext cx="3988151" cy="2642692"/>
+          </a:xfrm>
+          <a:prstGeom prst="rect">
+            <a:avLst/>
+          </a:prstGeom>
+        </p:spPr>
+      </p:pic>
+      <p:sp>
+        <p:nvSpPr>
+          <p:cNvPr id="10" name="Right Arrow 9">
+            <a:extLst>
+              <a:ext uri="{FF2B5EF4-FFF2-40B4-BE49-F238E27FC236}">
+                <a16:creationId xmlns:a16="http://schemas.microsoft.com/office/drawing/2014/main" id="{087AEB57-A100-93C6-429E-88F5817A04F8}"/>
+              </a:ext>
+            </a:extLst>
+          </p:cNvPr>
+          <p:cNvSpPr/>
+          <p:nvPr/>
+        </p:nvSpPr>
+        <p:spPr>
+          <a:xfrm>
+            <a:off x="5588000" y="2317664"/>
+            <a:ext cx="1016000" cy="347809"/>
+          </a:xfrm>
+          <a:prstGeom prst="rightArrow">
+            <a:avLst/>
+          </a:prstGeom>
+          <a:solidFill>
+            <a:schemeClr val="tx1"/>
+          </a:solidFill>
+          <a:ln>
+            <a:noFill/>
+          </a:ln>
+        </p:spPr>
+        <p:style>
+          <a:lnRef idx="2">
+            <a:schemeClr val="accent1">
+              <a:shade val="15000"/>
+            </a:schemeClr>
+          </a:lnRef>
+          <a:fillRef idx="1">
+            <a:schemeClr val="accent1"/>
+          </a:fillRef>
+          <a:effectRef idx="0">
+            <a:schemeClr val="accent1"/>
+          </a:effectRef>
+          <a:fontRef idx="minor">
+            <a:schemeClr val="lt1"/>
+          </a:fontRef>
+        </p:style>
+        <p:txBody>
+          <a:bodyPr rtlCol="0" anchor="ctr"/>
+          <a:lstStyle/>
+          <a:p>
+            <a:pPr algn="ctr"/>
+            <a:endParaRPr lang="en-US"/>
+          </a:p>
+        </p:txBody>
+      </p:sp>
+      <p:sp>
+        <p:nvSpPr>
+          <p:cNvPr id="11" name="Right Arrow 10">
+            <a:extLst>
+              <a:ext uri="{FF2B5EF4-FFF2-40B4-BE49-F238E27FC236}">
+                <a16:creationId xmlns:a16="http://schemas.microsoft.com/office/drawing/2014/main" id="{24BFB14B-AECE-C6DA-572B-6F2B6F98B5D5}"/>
+              </a:ext>
+            </a:extLst>
+          </p:cNvPr>
+          <p:cNvSpPr/>
+          <p:nvPr/>
+        </p:nvSpPr>
+        <p:spPr>
+          <a:xfrm>
+            <a:off x="5588000" y="5088126"/>
+            <a:ext cx="1016000" cy="347809"/>
+          </a:xfrm>
+          <a:prstGeom prst="rightArrow">
+            <a:avLst/>
+          </a:prstGeom>
+          <a:solidFill>
+            <a:schemeClr val="tx1"/>
+          </a:solidFill>
+          <a:ln>
+            <a:noFill/>
+          </a:ln>
+        </p:spPr>
+        <p:style>
+          <a:lnRef idx="2">
+            <a:schemeClr val="accent1">
+              <a:shade val="15000"/>
+            </a:schemeClr>
+          </a:lnRef>
+          <a:fillRef idx="1">
+            <a:schemeClr val="accent1"/>
+          </a:fillRef>
+          <a:effectRef idx="0">
+            <a:schemeClr val="accent1"/>
+          </a:effectRef>
+          <a:fontRef idx="minor">
+            <a:schemeClr val="lt1"/>
+          </a:fontRef>
+        </p:style>
+        <p:txBody>
+          <a:bodyPr rtlCol="0" anchor="ctr"/>
+          <a:lstStyle/>
+          <a:p>
+            <a:pPr algn="ctr"/>
+            <a:endParaRPr lang="en-US"/>
           </a:p>
         </p:txBody>
       </p:sp>

</xml_diff>